<commit_message>
Sha evaluat la recuperacio de les llums
Sha fet un petit powerpoint on es evalua la recuperacio de les llums
</commit_message>
<xml_diff>
--- a/Other/ExtraFunctionalities/calibrationImages/Presentación1.pptx
+++ b/Other/ExtraFunctionalities/calibrationImages/Presentación1.pptx
@@ -6,6 +6,7 @@
   </p:sldMasterIdLst>
   <p:sldIdLst>
     <p:sldId id="256" r:id="rId2"/>
+    <p:sldId id="257" r:id="rId3"/>
   </p:sldIdLst>
   <p:sldSz cx="9144000" cy="6858000" type="screen4x3"/>
   <p:notesSz cx="6858000" cy="9144000"/>
@@ -104,6 +105,22 @@
       </a:defRPr>
     </a:lvl9pPr>
   </p:defaultTextStyle>
+  <p:extLst>
+    <p:ext uri="{EFAFB233-063F-42B5-8137-9DF3F51BA10A}">
+      <p15:sldGuideLst xmlns:p15="http://schemas.microsoft.com/office/powerpoint/2012/main">
+        <p15:guide id="1" orient="horz" pos="2160">
+          <p15:clr>
+            <a:srgbClr val="A4A3A4"/>
+          </p15:clr>
+        </p15:guide>
+        <p15:guide id="2" pos="2880">
+          <p15:clr>
+            <a:srgbClr val="A4A3A4"/>
+          </p15:clr>
+        </p15:guide>
+      </p15:sldGuideLst>
+    </p:ext>
+  </p:extLst>
 </p:presentation>
 </file>
 
@@ -288,7 +305,7 @@
           <a:p>
             <a:fld id="{0A3DFE77-D9F9-4BA3-A8ED-B2DD2E844BE9}" type="datetimeFigureOut">
               <a:rPr lang="ca-ES" smtClean="0"/>
-              <a:t>07/07/2016</a:t>
+              <a:t>7/7/2016</a:t>
             </a:fld>
             <a:endParaRPr lang="ca-ES"/>
           </a:p>
@@ -330,7 +347,7 @@
           <a:p>
             <a:fld id="{15CABFF4-0AF5-4D69-B8F2-C10AE2FBEE8E}" type="slidenum">
               <a:rPr lang="ca-ES" smtClean="0"/>
-              <a:t>‹Nº›</a:t>
+              <a:t>‹#›</a:t>
             </a:fld>
             <a:endParaRPr lang="ca-ES"/>
           </a:p>
@@ -453,7 +470,7 @@
           <a:p>
             <a:fld id="{0A3DFE77-D9F9-4BA3-A8ED-B2DD2E844BE9}" type="datetimeFigureOut">
               <a:rPr lang="ca-ES" smtClean="0"/>
-              <a:t>07/07/2016</a:t>
+              <a:t>7/7/2016</a:t>
             </a:fld>
             <a:endParaRPr lang="ca-ES"/>
           </a:p>
@@ -495,7 +512,7 @@
           <a:p>
             <a:fld id="{15CABFF4-0AF5-4D69-B8F2-C10AE2FBEE8E}" type="slidenum">
               <a:rPr lang="ca-ES" smtClean="0"/>
-              <a:t>‹Nº›</a:t>
+              <a:t>‹#›</a:t>
             </a:fld>
             <a:endParaRPr lang="ca-ES"/>
           </a:p>
@@ -628,7 +645,7 @@
           <a:p>
             <a:fld id="{0A3DFE77-D9F9-4BA3-A8ED-B2DD2E844BE9}" type="datetimeFigureOut">
               <a:rPr lang="ca-ES" smtClean="0"/>
-              <a:t>07/07/2016</a:t>
+              <a:t>7/7/2016</a:t>
             </a:fld>
             <a:endParaRPr lang="ca-ES"/>
           </a:p>
@@ -670,7 +687,7 @@
           <a:p>
             <a:fld id="{15CABFF4-0AF5-4D69-B8F2-C10AE2FBEE8E}" type="slidenum">
               <a:rPr lang="ca-ES" smtClean="0"/>
-              <a:t>‹Nº›</a:t>
+              <a:t>‹#›</a:t>
             </a:fld>
             <a:endParaRPr lang="ca-ES"/>
           </a:p>
@@ -793,7 +810,7 @@
           <a:p>
             <a:fld id="{0A3DFE77-D9F9-4BA3-A8ED-B2DD2E844BE9}" type="datetimeFigureOut">
               <a:rPr lang="ca-ES" smtClean="0"/>
-              <a:t>07/07/2016</a:t>
+              <a:t>7/7/2016</a:t>
             </a:fld>
             <a:endParaRPr lang="ca-ES"/>
           </a:p>
@@ -835,7 +852,7 @@
           <a:p>
             <a:fld id="{15CABFF4-0AF5-4D69-B8F2-C10AE2FBEE8E}" type="slidenum">
               <a:rPr lang="ca-ES" smtClean="0"/>
-              <a:t>‹Nº›</a:t>
+              <a:t>‹#›</a:t>
             </a:fld>
             <a:endParaRPr lang="ca-ES"/>
           </a:p>
@@ -1034,7 +1051,7 @@
           <a:p>
             <a:fld id="{0A3DFE77-D9F9-4BA3-A8ED-B2DD2E844BE9}" type="datetimeFigureOut">
               <a:rPr lang="ca-ES" smtClean="0"/>
-              <a:t>07/07/2016</a:t>
+              <a:t>7/7/2016</a:t>
             </a:fld>
             <a:endParaRPr lang="ca-ES"/>
           </a:p>
@@ -1076,7 +1093,7 @@
           <a:p>
             <a:fld id="{15CABFF4-0AF5-4D69-B8F2-C10AE2FBEE8E}" type="slidenum">
               <a:rPr lang="ca-ES" smtClean="0"/>
-              <a:t>‹Nº›</a:t>
+              <a:t>‹#›</a:t>
             </a:fld>
             <a:endParaRPr lang="ca-ES"/>
           </a:p>
@@ -1317,7 +1334,7 @@
           <a:p>
             <a:fld id="{0A3DFE77-D9F9-4BA3-A8ED-B2DD2E844BE9}" type="datetimeFigureOut">
               <a:rPr lang="ca-ES" smtClean="0"/>
-              <a:t>07/07/2016</a:t>
+              <a:t>7/7/2016</a:t>
             </a:fld>
             <a:endParaRPr lang="ca-ES"/>
           </a:p>
@@ -1359,7 +1376,7 @@
           <a:p>
             <a:fld id="{15CABFF4-0AF5-4D69-B8F2-C10AE2FBEE8E}" type="slidenum">
               <a:rPr lang="ca-ES" smtClean="0"/>
-              <a:t>‹Nº›</a:t>
+              <a:t>‹#›</a:t>
             </a:fld>
             <a:endParaRPr lang="ca-ES"/>
           </a:p>
@@ -1734,7 +1751,7 @@
           <a:p>
             <a:fld id="{0A3DFE77-D9F9-4BA3-A8ED-B2DD2E844BE9}" type="datetimeFigureOut">
               <a:rPr lang="ca-ES" smtClean="0"/>
-              <a:t>07/07/2016</a:t>
+              <a:t>7/7/2016</a:t>
             </a:fld>
             <a:endParaRPr lang="ca-ES"/>
           </a:p>
@@ -1776,7 +1793,7 @@
           <a:p>
             <a:fld id="{15CABFF4-0AF5-4D69-B8F2-C10AE2FBEE8E}" type="slidenum">
               <a:rPr lang="ca-ES" smtClean="0"/>
-              <a:t>‹Nº›</a:t>
+              <a:t>‹#›</a:t>
             </a:fld>
             <a:endParaRPr lang="ca-ES"/>
           </a:p>
@@ -1847,7 +1864,7 @@
           <a:p>
             <a:fld id="{0A3DFE77-D9F9-4BA3-A8ED-B2DD2E844BE9}" type="datetimeFigureOut">
               <a:rPr lang="ca-ES" smtClean="0"/>
-              <a:t>07/07/2016</a:t>
+              <a:t>7/7/2016</a:t>
             </a:fld>
             <a:endParaRPr lang="ca-ES"/>
           </a:p>
@@ -1889,7 +1906,7 @@
           <a:p>
             <a:fld id="{15CABFF4-0AF5-4D69-B8F2-C10AE2FBEE8E}" type="slidenum">
               <a:rPr lang="ca-ES" smtClean="0"/>
-              <a:t>‹Nº›</a:t>
+              <a:t>‹#›</a:t>
             </a:fld>
             <a:endParaRPr lang="ca-ES"/>
           </a:p>
@@ -1937,7 +1954,7 @@
           <a:p>
             <a:fld id="{0A3DFE77-D9F9-4BA3-A8ED-B2DD2E844BE9}" type="datetimeFigureOut">
               <a:rPr lang="ca-ES" smtClean="0"/>
-              <a:t>07/07/2016</a:t>
+              <a:t>7/7/2016</a:t>
             </a:fld>
             <a:endParaRPr lang="ca-ES"/>
           </a:p>
@@ -1979,7 +1996,7 @@
           <a:p>
             <a:fld id="{15CABFF4-0AF5-4D69-B8F2-C10AE2FBEE8E}" type="slidenum">
               <a:rPr lang="ca-ES" smtClean="0"/>
-              <a:t>‹Nº›</a:t>
+              <a:t>‹#›</a:t>
             </a:fld>
             <a:endParaRPr lang="ca-ES"/>
           </a:p>
@@ -2209,7 +2226,7 @@
           <a:p>
             <a:fld id="{0A3DFE77-D9F9-4BA3-A8ED-B2DD2E844BE9}" type="datetimeFigureOut">
               <a:rPr lang="ca-ES" smtClean="0"/>
-              <a:t>07/07/2016</a:t>
+              <a:t>7/7/2016</a:t>
             </a:fld>
             <a:endParaRPr lang="ca-ES"/>
           </a:p>
@@ -2251,7 +2268,7 @@
           <a:p>
             <a:fld id="{15CABFF4-0AF5-4D69-B8F2-C10AE2FBEE8E}" type="slidenum">
               <a:rPr lang="ca-ES" smtClean="0"/>
-              <a:t>‹Nº›</a:t>
+              <a:t>‹#›</a:t>
             </a:fld>
             <a:endParaRPr lang="ca-ES"/>
           </a:p>
@@ -2457,7 +2474,7 @@
           <a:p>
             <a:fld id="{0A3DFE77-D9F9-4BA3-A8ED-B2DD2E844BE9}" type="datetimeFigureOut">
               <a:rPr lang="ca-ES" smtClean="0"/>
-              <a:t>07/07/2016</a:t>
+              <a:t>7/7/2016</a:t>
             </a:fld>
             <a:endParaRPr lang="ca-ES"/>
           </a:p>
@@ -2499,7 +2516,7 @@
           <a:p>
             <a:fld id="{15CABFF4-0AF5-4D69-B8F2-C10AE2FBEE8E}" type="slidenum">
               <a:rPr lang="ca-ES" smtClean="0"/>
-              <a:t>‹Nº›</a:t>
+              <a:t>‹#›</a:t>
             </a:fld>
             <a:endParaRPr lang="ca-ES"/>
           </a:p>
@@ -2665,7 +2682,7 @@
           <a:p>
             <a:fld id="{0A3DFE77-D9F9-4BA3-A8ED-B2DD2E844BE9}" type="datetimeFigureOut">
               <a:rPr lang="ca-ES" smtClean="0"/>
-              <a:t>07/07/2016</a:t>
+              <a:t>7/7/2016</a:t>
             </a:fld>
             <a:endParaRPr lang="ca-ES"/>
           </a:p>
@@ -2743,7 +2760,7 @@
           <a:p>
             <a:fld id="{15CABFF4-0AF5-4D69-B8F2-C10AE2FBEE8E}" type="slidenum">
               <a:rPr lang="ca-ES" smtClean="0"/>
-              <a:t>‹Nº›</a:t>
+              <a:t>‹#›</a:t>
             </a:fld>
             <a:endParaRPr lang="ca-ES"/>
           </a:p>
@@ -3349,7 +3366,7 @@
         </p:nvSpPr>
         <p:spPr>
           <a:xfrm>
-            <a:off x="3275856" y="3068960"/>
+            <a:off x="3330033" y="3074813"/>
             <a:ext cx="1224136" cy="523220"/>
           </a:xfrm>
           <a:prstGeom prst="rect">
@@ -3364,12 +3381,12 @@
           <a:lstStyle/>
           <a:p>
             <a:r>
-              <a:rPr lang="ca-ES" sz="2800" b="1" dirty="0" smtClean="0">
+              <a:rPr lang="ca-ES" sz="2800" b="1" dirty="0">
                 <a:solidFill>
                   <a:schemeClr val="accent6"/>
                 </a:solidFill>
               </a:rPr>
-              <a:t>X</a:t>
+              <a:t>Y</a:t>
             </a:r>
             <a:endParaRPr lang="ca-ES" sz="2800" b="1" dirty="0">
               <a:solidFill>
@@ -3407,8 +3424,13 @@
                   <a:schemeClr val="accent6"/>
                 </a:solidFill>
               </a:rPr>
-              <a:t>Y</a:t>
-            </a:r>
+              <a:t>X</a:t>
+            </a:r>
+            <a:endParaRPr lang="ca-ES" sz="3200" b="1" dirty="0" smtClean="0">
+              <a:solidFill>
+                <a:schemeClr val="accent6"/>
+              </a:solidFill>
+            </a:endParaRPr>
           </a:p>
           <a:p>
             <a:endParaRPr lang="ca-ES" sz="3200" b="1" dirty="0">
@@ -3475,7 +3497,47 @@
                   <a:schemeClr val="accent6"/>
                 </a:solidFill>
               </a:rPr>
-              <a:t>= (-0.107, -0.32, -0.94)</a:t>
+              <a:t>= </a:t>
+            </a:r>
+            <a:r>
+              <a:rPr lang="ca-ES" sz="2400" b="1" dirty="0">
+                <a:solidFill>
+                  <a:schemeClr val="accent6"/>
+                </a:solidFill>
+              </a:rPr>
+              <a:t>(-0.32 </a:t>
+            </a:r>
+            <a:r>
+              <a:rPr lang="ca-ES" sz="2400" b="1" dirty="0" smtClean="0">
+                <a:solidFill>
+                  <a:schemeClr val="accent6"/>
+                </a:solidFill>
+              </a:rPr>
+              <a:t>,-</a:t>
+            </a:r>
+            <a:r>
+              <a:rPr lang="ca-ES" sz="2400" b="1" dirty="0" smtClean="0">
+                <a:solidFill>
+                  <a:schemeClr val="accent6"/>
+                </a:solidFill>
+              </a:rPr>
+              <a:t>0.107</a:t>
+            </a:r>
+            <a:r>
+              <a:rPr lang="ca-ES" sz="2400" b="1" dirty="0" smtClean="0">
+                <a:solidFill>
+                  <a:schemeClr val="accent6"/>
+                </a:solidFill>
+              </a:rPr>
+              <a:t>, </a:t>
+            </a:r>
+            <a:r>
+              <a:rPr lang="ca-ES" sz="2400" b="1" dirty="0" smtClean="0">
+                <a:solidFill>
+                  <a:schemeClr val="accent6"/>
+                </a:solidFill>
+              </a:rPr>
+              <a:t>-0.94)</a:t>
             </a:r>
             <a:br>
               <a:rPr lang="ca-ES" sz="2400" b="1" dirty="0" smtClean="0">
@@ -3519,42 +3581,30 @@
           <a:lstStyle/>
           <a:p>
             <a:r>
-              <a:rPr lang="ca-ES" sz="2400" b="1" dirty="0" smtClean="0">
-                <a:solidFill>
-                  <a:schemeClr val="accent6"/>
-                </a:solidFill>
-              </a:rPr>
+              <a:rPr lang="ca-ES" sz="2400" b="1" dirty="0" smtClean="0"/>
               <a:t>LLUM 2:</a:t>
             </a:r>
             <a:br>
-              <a:rPr lang="ca-ES" sz="2400" b="1" dirty="0" smtClean="0">
-                <a:solidFill>
-                  <a:schemeClr val="accent6"/>
-                </a:solidFill>
-              </a:rPr>
+              <a:rPr lang="ca-ES" sz="2400" b="1" dirty="0" smtClean="0"/>
             </a:br>
             <a:r>
-              <a:rPr lang="ca-ES" sz="2400" b="1" dirty="0" smtClean="0">
-                <a:solidFill>
-                  <a:schemeClr val="accent6"/>
-                </a:solidFill>
-              </a:rPr>
+              <a:rPr lang="ca-ES" sz="2400" b="1" dirty="0" smtClean="0"/>
               <a:t>(9,4.2,-110)</a:t>
             </a:r>
             <a:br>
-              <a:rPr lang="ca-ES" sz="2400" b="1" dirty="0" smtClean="0">
-                <a:solidFill>
-                  <a:schemeClr val="accent6"/>
-                </a:solidFill>
-              </a:rPr>
+              <a:rPr lang="ca-ES" sz="2400" b="1" dirty="0" smtClean="0"/>
             </a:br>
             <a:r>
-              <a:rPr lang="ca-ES" sz="2400" b="1" dirty="0" smtClean="0">
-                <a:solidFill>
-                  <a:schemeClr val="accent6"/>
-                </a:solidFill>
-              </a:rPr>
-              <a:t>u= (0.038, 0.08,-0.99)</a:t>
+              <a:rPr lang="ca-ES" sz="2400" b="1" dirty="0" smtClean="0"/>
+              <a:t>u= (</a:t>
+            </a:r>
+            <a:r>
+              <a:rPr lang="ca-ES" sz="2400" b="1" dirty="0" smtClean="0"/>
+              <a:t>0.08, 0.038,-</a:t>
+            </a:r>
+            <a:r>
+              <a:rPr lang="ca-ES" sz="2400" b="1" dirty="0" smtClean="0"/>
+              <a:t>0.99)</a:t>
             </a:r>
           </a:p>
         </p:txBody>
@@ -3566,9 +3616,9 @@
           <p:nvPr/>
         </p:nvSpPr>
         <p:spPr>
-          <a:xfrm rot="19713726">
-            <a:off x="6996539" y="2873620"/>
-            <a:ext cx="2626085" cy="1200329"/>
+          <a:xfrm rot="20463288">
+            <a:off x="6282775" y="3026417"/>
+            <a:ext cx="2861243" cy="1200329"/>
           </a:xfrm>
           <a:prstGeom prst="rect">
             <a:avLst/>
@@ -3584,22 +3634,38 @@
             <a:r>
               <a:rPr lang="ca-ES" sz="2400" b="1" dirty="0" smtClean="0">
                 <a:solidFill>
-                  <a:schemeClr val="accent6"/>
+                  <a:schemeClr val="accent6">
+                    <a:lumMod val="50000"/>
+                  </a:schemeClr>
                 </a:solidFill>
               </a:rPr>
-              <a:t>LLUM 3:</a:t>
+              <a:t>	LLUM </a:t>
+            </a:r>
+            <a:r>
+              <a:rPr lang="ca-ES" sz="2400" b="1" dirty="0" smtClean="0">
+                <a:solidFill>
+                  <a:schemeClr val="accent6">
+                    <a:lumMod val="50000"/>
+                  </a:schemeClr>
+                </a:solidFill>
+              </a:rPr>
+              <a:t>3:</a:t>
             </a:r>
             <a:br>
               <a:rPr lang="ca-ES" sz="2400" b="1" dirty="0" smtClean="0">
                 <a:solidFill>
-                  <a:schemeClr val="accent6"/>
+                  <a:schemeClr val="accent6">
+                    <a:lumMod val="50000"/>
+                  </a:schemeClr>
                 </a:solidFill>
               </a:rPr>
             </a:br>
             <a:r>
               <a:rPr lang="ca-ES" sz="2400" b="1" dirty="0" smtClean="0">
                 <a:solidFill>
-                  <a:schemeClr val="accent6"/>
+                  <a:schemeClr val="accent6">
+                    <a:lumMod val="50000"/>
+                  </a:schemeClr>
                 </a:solidFill>
               </a:rPr>
               <a:t>(53,19,-110)</a:t>
@@ -3607,19 +3673,379 @@
             <a:br>
               <a:rPr lang="ca-ES" sz="2400" b="1" dirty="0" smtClean="0">
                 <a:solidFill>
-                  <a:schemeClr val="accent6"/>
+                  <a:schemeClr val="accent6">
+                    <a:lumMod val="50000"/>
+                  </a:schemeClr>
                 </a:solidFill>
               </a:rPr>
             </a:br>
+            <a:r>
+              <a:rPr lang="ca-ES" sz="2400" b="1" dirty="0" smtClean="0">
+                <a:solidFill>
+                  <a:schemeClr val="accent6">
+                    <a:lumMod val="50000"/>
+                  </a:schemeClr>
+                </a:solidFill>
+              </a:rPr>
+              <a:t>u= (0.43, 0.15,-0.89)</a:t>
+            </a:r>
             <a:endParaRPr lang="ca-ES" sz="2400" b="1" dirty="0">
               <a:solidFill>
-                <a:schemeClr val="accent6"/>
+                <a:schemeClr val="accent6">
+                  <a:lumMod val="50000"/>
+                </a:schemeClr>
               </a:solidFill>
             </a:endParaRPr>
           </a:p>
         </p:txBody>
       </p:sp>
     </p:spTree>
+  </p:cSld>
+  <p:clrMapOvr>
+    <a:masterClrMapping/>
+  </p:clrMapOvr>
+</p:sld>
+</file>
+
+<file path=ppt/slides/slide2.xml><?xml version="1.0" encoding="utf-8"?>
+<p:sld xmlns:a="http://schemas.openxmlformats.org/drawingml/2006/main" xmlns:r="http://schemas.openxmlformats.org/officeDocument/2006/relationships" xmlns:p="http://schemas.openxmlformats.org/presentationml/2006/main">
+  <p:cSld>
+    <p:spTree>
+      <p:nvGrpSpPr>
+        <p:cNvPr id="1" name=""/>
+        <p:cNvGrpSpPr/>
+        <p:nvPr/>
+      </p:nvGrpSpPr>
+      <p:grpSpPr>
+        <a:xfrm>
+          <a:off x="0" y="0"/>
+          <a:ext cx="0" cy="0"/>
+          <a:chOff x="0" y="0"/>
+          <a:chExt cx="0" cy="0"/>
+        </a:xfrm>
+      </p:grpSpPr>
+      <p:graphicFrame>
+        <p:nvGraphicFramePr>
+          <p:cNvPr id="4" name="Table 3"/>
+          <p:cNvGraphicFramePr>
+            <a:graphicFrameLocks noGrp="1"/>
+          </p:cNvGraphicFramePr>
+          <p:nvPr>
+            <p:extLst>
+              <p:ext uri="{D42A27DB-BD31-4B8C-83A1-F6EECF244321}">
+                <p14:modId xmlns:p14="http://schemas.microsoft.com/office/powerpoint/2010/main" val="2169376284"/>
+              </p:ext>
+            </p:extLst>
+          </p:nvPr>
+        </p:nvGraphicFramePr>
+        <p:xfrm>
+          <a:off x="1043608" y="764704"/>
+          <a:ext cx="7224464" cy="2032001"/>
+        </p:xfrm>
+        <a:graphic>
+          <a:graphicData uri="http://schemas.openxmlformats.org/drawingml/2006/table">
+            <a:tbl>
+              <a:tblPr firstRow="1" bandRow="1">
+                <a:tableStyleId>{5C22544A-7EE6-4342-B048-85BDC9FD1C3A}</a:tableStyleId>
+              </a:tblPr>
+              <a:tblGrid>
+                <a:gridCol w="2408155"/>
+                <a:gridCol w="2416122"/>
+                <a:gridCol w="2400187"/>
+              </a:tblGrid>
+              <a:tr h="509746">
+                <a:tc>
+                  <a:txBody>
+                    <a:bodyPr/>
+                    <a:lstStyle/>
+                    <a:p>
+                      <a:pPr algn="ctr"/>
+                      <a:endParaRPr lang="es-ES" dirty="0"/>
+                    </a:p>
+                  </a:txBody>
+                  <a:tcPr/>
+                </a:tc>
+                <a:tc>
+                  <a:txBody>
+                    <a:bodyPr/>
+                    <a:lstStyle/>
+                    <a:p>
+                      <a:pPr algn="ctr"/>
+                      <a:r>
+                        <a:rPr lang="es-ES" dirty="0" err="1" smtClean="0"/>
+                        <a:t>Mesurat</a:t>
+                      </a:r>
+                      <a:endParaRPr lang="es-ES" dirty="0"/>
+                    </a:p>
+                  </a:txBody>
+                  <a:tcPr/>
+                </a:tc>
+                <a:tc>
+                  <a:txBody>
+                    <a:bodyPr/>
+                    <a:lstStyle/>
+                    <a:p>
+                      <a:pPr algn="ctr"/>
+                      <a:r>
+                        <a:rPr lang="es-ES" dirty="0" err="1" smtClean="0"/>
+                        <a:t>Calculat</a:t>
+                      </a:r>
+                      <a:endParaRPr lang="es-ES" dirty="0"/>
+                    </a:p>
+                  </a:txBody>
+                  <a:tcPr/>
+                </a:tc>
+              </a:tr>
+              <a:tr h="502763">
+                <a:tc>
+                  <a:txBody>
+                    <a:bodyPr/>
+                    <a:lstStyle/>
+                    <a:p>
+                      <a:pPr algn="ctr"/>
+                      <a:r>
+                        <a:rPr lang="es-ES" dirty="0" err="1" smtClean="0"/>
+                        <a:t>Llum</a:t>
+                      </a:r>
+                      <a:r>
+                        <a:rPr lang="es-ES" dirty="0" smtClean="0"/>
+                        <a:t> 1</a:t>
+                      </a:r>
+                      <a:endParaRPr lang="es-ES" dirty="0"/>
+                    </a:p>
+                  </a:txBody>
+                  <a:tcPr/>
+                </a:tc>
+                <a:tc>
+                  <a:txBody>
+                    <a:bodyPr/>
+                    <a:lstStyle/>
+                    <a:p>
+                      <a:pPr algn="ctr"/>
+                      <a:r>
+                        <a:rPr lang="es-ES" dirty="0" smtClean="0"/>
+                        <a:t>(-0.32 ,-0.107, -0.94)</a:t>
+                      </a:r>
+                      <a:endParaRPr lang="es-ES" dirty="0"/>
+                    </a:p>
+                  </a:txBody>
+                  <a:tcPr/>
+                </a:tc>
+                <a:tc>
+                  <a:txBody>
+                    <a:bodyPr/>
+                    <a:lstStyle/>
+                    <a:p>
+                      <a:pPr algn="ctr"/>
+                      <a:r>
+                        <a:rPr lang="es-ES" dirty="0" smtClean="0"/>
+                        <a:t>(-0.29,-0.09,-0.95)</a:t>
+                      </a:r>
+                      <a:endParaRPr lang="es-ES" dirty="0"/>
+                    </a:p>
+                  </a:txBody>
+                  <a:tcPr/>
+                </a:tc>
+              </a:tr>
+              <a:tr h="509746">
+                <a:tc>
+                  <a:txBody>
+                    <a:bodyPr/>
+                    <a:lstStyle/>
+                    <a:p>
+                      <a:pPr algn="ctr"/>
+                      <a:r>
+                        <a:rPr lang="es-ES" dirty="0" err="1" smtClean="0"/>
+                        <a:t>Llum</a:t>
+                      </a:r>
+                      <a:r>
+                        <a:rPr lang="es-ES" dirty="0" smtClean="0"/>
+                        <a:t> 2</a:t>
+                      </a:r>
+                      <a:endParaRPr lang="es-ES" dirty="0"/>
+                    </a:p>
+                  </a:txBody>
+                  <a:tcPr/>
+                </a:tc>
+                <a:tc>
+                  <a:txBody>
+                    <a:bodyPr/>
+                    <a:lstStyle/>
+                    <a:p>
+                      <a:pPr algn="ctr"/>
+                      <a:r>
+                        <a:rPr lang="es-ES" dirty="0" smtClean="0"/>
+                        <a:t>(0.09, 0.038,-0.99)</a:t>
+                      </a:r>
+                    </a:p>
+                  </a:txBody>
+                  <a:tcPr/>
+                </a:tc>
+                <a:tc>
+                  <a:txBody>
+                    <a:bodyPr/>
+                    <a:lstStyle/>
+                    <a:p>
+                      <a:pPr algn="ctr"/>
+                      <a:r>
+                        <a:rPr lang="es-ES" dirty="0" smtClean="0"/>
+                        <a:t>(0.16,-0.03,-0.98)</a:t>
+                      </a:r>
+                      <a:endParaRPr lang="es-ES" dirty="0"/>
+                    </a:p>
+                  </a:txBody>
+                  <a:tcPr/>
+                </a:tc>
+              </a:tr>
+              <a:tr h="509746">
+                <a:tc>
+                  <a:txBody>
+                    <a:bodyPr/>
+                    <a:lstStyle/>
+                    <a:p>
+                      <a:pPr algn="ctr"/>
+                      <a:r>
+                        <a:rPr lang="es-ES" dirty="0" err="1" smtClean="0"/>
+                        <a:t>Llum</a:t>
+                      </a:r>
+                      <a:r>
+                        <a:rPr lang="es-ES" dirty="0" smtClean="0"/>
+                        <a:t> 3</a:t>
+                      </a:r>
+                      <a:endParaRPr lang="es-ES" dirty="0"/>
+                    </a:p>
+                  </a:txBody>
+                  <a:tcPr/>
+                </a:tc>
+                <a:tc>
+                  <a:txBody>
+                    <a:bodyPr/>
+                    <a:lstStyle/>
+                    <a:p>
+                      <a:pPr algn="ctr"/>
+                      <a:r>
+                        <a:rPr lang="es-ES" dirty="0" smtClean="0"/>
+                        <a:t>(0.43, 0.15,-0.89)</a:t>
+                      </a:r>
+                    </a:p>
+                  </a:txBody>
+                  <a:tcPr/>
+                </a:tc>
+                <a:tc>
+                  <a:txBody>
+                    <a:bodyPr/>
+                    <a:lstStyle/>
+                    <a:p>
+                      <a:pPr algn="ctr"/>
+                      <a:r>
+                        <a:rPr lang="es-ES" dirty="0" smtClean="0"/>
+                        <a:t>(0.52,0.047,-0.847)</a:t>
+                      </a:r>
+                      <a:endParaRPr lang="es-ES" dirty="0"/>
+                    </a:p>
+                  </a:txBody>
+                  <a:tcPr/>
+                </a:tc>
+              </a:tr>
+            </a:tbl>
+          </a:graphicData>
+        </a:graphic>
+      </p:graphicFrame>
+      <p:sp>
+        <p:nvSpPr>
+          <p:cNvPr id="5" name="TextBox 4"/>
+          <p:cNvSpPr txBox="1"/>
+          <p:nvPr/>
+        </p:nvSpPr>
+        <p:spPr>
+          <a:xfrm>
+            <a:off x="1017442" y="3212976"/>
+            <a:ext cx="6552728" cy="1477328"/>
+          </a:xfrm>
+          <a:prstGeom prst="rect">
+            <a:avLst/>
+          </a:prstGeom>
+          <a:noFill/>
+        </p:spPr>
+        <p:txBody>
+          <a:bodyPr wrap="square" rtlCol="0">
+            <a:spAutoFit/>
+          </a:bodyPr>
+          <a:lstStyle/>
+          <a:p>
+            <a:r>
+              <a:rPr lang="es-ES" dirty="0" err="1" smtClean="0"/>
+              <a:t>Sabent</a:t>
+            </a:r>
+            <a:r>
+              <a:rPr lang="es-ES" dirty="0" smtClean="0"/>
+              <a:t> que les </a:t>
+            </a:r>
+            <a:r>
+              <a:rPr lang="es-ES" dirty="0" err="1" smtClean="0"/>
+              <a:t>llums</a:t>
+            </a:r>
+            <a:r>
+              <a:rPr lang="es-ES" dirty="0" smtClean="0"/>
+              <a:t> a una altura de -110 cm, </a:t>
+            </a:r>
+            <a:r>
+              <a:rPr lang="es-ES" dirty="0" err="1" smtClean="0"/>
+              <a:t>podem</a:t>
+            </a:r>
+            <a:r>
+              <a:rPr lang="es-ES" dirty="0" smtClean="0"/>
+              <a:t> calcular quina es la distancia entre </a:t>
+            </a:r>
+            <a:r>
+              <a:rPr lang="es-ES" dirty="0" err="1" smtClean="0"/>
+              <a:t>llums</a:t>
+            </a:r>
+            <a:r>
+              <a:rPr lang="es-ES" dirty="0" smtClean="0"/>
+              <a:t>:</a:t>
+            </a:r>
+          </a:p>
+          <a:p>
+            <a:endParaRPr lang="es-ES" dirty="0"/>
+          </a:p>
+          <a:p>
+            <a:r>
+              <a:rPr lang="es-ES" dirty="0" smtClean="0"/>
+              <a:t>Distancia Llum1-Llum2: 49.3 cm (</a:t>
+            </a:r>
+            <a:r>
+              <a:rPr lang="es-ES" dirty="0" err="1" smtClean="0"/>
+              <a:t>Mesurats</a:t>
+            </a:r>
+            <a:r>
+              <a:rPr lang="es-ES" dirty="0" smtClean="0"/>
+              <a:t> entre 49 i 50) </a:t>
+            </a:r>
+          </a:p>
+          <a:p>
+            <a:r>
+              <a:rPr lang="es-ES" dirty="0" smtClean="0"/>
+              <a:t>Distancia Llum2-Llum3: 46.42 cm (</a:t>
+            </a:r>
+            <a:r>
+              <a:rPr lang="es-ES" dirty="0" err="1" smtClean="0"/>
+              <a:t>Mesurats</a:t>
+            </a:r>
+            <a:r>
+              <a:rPr lang="es-ES" smtClean="0"/>
+              <a:t> entre 46 i 47)</a:t>
+            </a:r>
+            <a:endParaRPr lang="es-ES" dirty="0" smtClean="0"/>
+          </a:p>
+        </p:txBody>
+      </p:sp>
+    </p:spTree>
+    <p:extLst>
+      <p:ext uri="{BB962C8B-B14F-4D97-AF65-F5344CB8AC3E}">
+        <p14:creationId xmlns:p14="http://schemas.microsoft.com/office/powerpoint/2010/main" val="3247629943"/>
+      </p:ext>
+    </p:extLst>
   </p:cSld>
   <p:clrMapOvr>
     <a:masterClrMapping/>

</xml_diff>